<commit_message>
License update Other small updates
</commit_message>
<xml_diff>
--- a/Translation Manchester/TranslationManchester Poster S Bate.pptx
+++ b/Translation Manchester/TranslationManchester Poster S Bate.pptx
@@ -197,7 +197,7 @@
           <a:p>
             <a:fld id="{A431EEA5-A78F-DB45-96EB-FBF92640D929}" type="datetimeFigureOut">
               <a:rPr lang="en-GB" smtClean="0"/>
-              <a:t>25/10/2022</a:t>
+              <a:t>26/10/2022</a:t>
             </a:fld>
             <a:endParaRPr lang="en-GB"/>
           </a:p>
@@ -677,7 +677,7 @@
           <a:p>
             <a:fld id="{1717ADA9-02D2-416D-AE12-6CE0C9BB6E51}" type="datetimeFigureOut">
               <a:rPr lang="en-GB" smtClean="0"/>
-              <a:t>25/10/2022</a:t>
+              <a:t>26/10/2022</a:t>
             </a:fld>
             <a:endParaRPr lang="en-GB"/>
           </a:p>
@@ -845,7 +845,7 @@
           <a:p>
             <a:fld id="{1717ADA9-02D2-416D-AE12-6CE0C9BB6E51}" type="datetimeFigureOut">
               <a:rPr lang="en-GB" smtClean="0"/>
-              <a:t>25/10/2022</a:t>
+              <a:t>26/10/2022</a:t>
             </a:fld>
             <a:endParaRPr lang="en-GB"/>
           </a:p>
@@ -1023,7 +1023,7 @@
           <a:p>
             <a:fld id="{1717ADA9-02D2-416D-AE12-6CE0C9BB6E51}" type="datetimeFigureOut">
               <a:rPr lang="en-GB" smtClean="0"/>
-              <a:t>25/10/2022</a:t>
+              <a:t>26/10/2022</a:t>
             </a:fld>
             <a:endParaRPr lang="en-GB"/>
           </a:p>
@@ -1191,7 +1191,7 @@
           <a:p>
             <a:fld id="{1717ADA9-02D2-416D-AE12-6CE0C9BB6E51}" type="datetimeFigureOut">
               <a:rPr lang="en-GB" smtClean="0"/>
-              <a:t>25/10/2022</a:t>
+              <a:t>26/10/2022</a:t>
             </a:fld>
             <a:endParaRPr lang="en-GB"/>
           </a:p>
@@ -1434,7 +1434,7 @@
           <a:p>
             <a:fld id="{1717ADA9-02D2-416D-AE12-6CE0C9BB6E51}" type="datetimeFigureOut">
               <a:rPr lang="en-GB" smtClean="0"/>
-              <a:t>25/10/2022</a:t>
+              <a:t>26/10/2022</a:t>
             </a:fld>
             <a:endParaRPr lang="en-GB"/>
           </a:p>
@@ -1663,7 +1663,7 @@
           <a:p>
             <a:fld id="{1717ADA9-02D2-416D-AE12-6CE0C9BB6E51}" type="datetimeFigureOut">
               <a:rPr lang="en-GB" smtClean="0"/>
-              <a:t>25/10/2022</a:t>
+              <a:t>26/10/2022</a:t>
             </a:fld>
             <a:endParaRPr lang="en-GB"/>
           </a:p>
@@ -2027,7 +2027,7 @@
           <a:p>
             <a:fld id="{1717ADA9-02D2-416D-AE12-6CE0C9BB6E51}" type="datetimeFigureOut">
               <a:rPr lang="en-GB" smtClean="0"/>
-              <a:t>25/10/2022</a:t>
+              <a:t>26/10/2022</a:t>
             </a:fld>
             <a:endParaRPr lang="en-GB"/>
           </a:p>
@@ -2144,7 +2144,7 @@
           <a:p>
             <a:fld id="{1717ADA9-02D2-416D-AE12-6CE0C9BB6E51}" type="datetimeFigureOut">
               <a:rPr lang="en-GB" smtClean="0"/>
-              <a:t>25/10/2022</a:t>
+              <a:t>26/10/2022</a:t>
             </a:fld>
             <a:endParaRPr lang="en-GB"/>
           </a:p>
@@ -2239,7 +2239,7 @@
           <a:p>
             <a:fld id="{1717ADA9-02D2-416D-AE12-6CE0C9BB6E51}" type="datetimeFigureOut">
               <a:rPr lang="en-GB" smtClean="0"/>
-              <a:t>25/10/2022</a:t>
+              <a:t>26/10/2022</a:t>
             </a:fld>
             <a:endParaRPr lang="en-GB"/>
           </a:p>
@@ -2514,7 +2514,7 @@
           <a:p>
             <a:fld id="{1717ADA9-02D2-416D-AE12-6CE0C9BB6E51}" type="datetimeFigureOut">
               <a:rPr lang="en-GB" smtClean="0"/>
-              <a:t>25/10/2022</a:t>
+              <a:t>26/10/2022</a:t>
             </a:fld>
             <a:endParaRPr lang="en-GB"/>
           </a:p>
@@ -2769,7 +2769,7 @@
           <a:p>
             <a:fld id="{1717ADA9-02D2-416D-AE12-6CE0C9BB6E51}" type="datetimeFigureOut">
               <a:rPr lang="en-GB" smtClean="0"/>
-              <a:t>25/10/2022</a:t>
+              <a:t>26/10/2022</a:t>
             </a:fld>
             <a:endParaRPr lang="en-GB"/>
           </a:p>
@@ -2980,7 +2980,7 @@
           <a:p>
             <a:fld id="{1717ADA9-02D2-416D-AE12-6CE0C9BB6E51}" type="datetimeFigureOut">
               <a:rPr lang="en-GB" smtClean="0"/>
-              <a:t>25/10/2022</a:t>
+              <a:t>26/10/2022</a:t>
             </a:fld>
             <a:endParaRPr lang="en-GB"/>
           </a:p>
@@ -3526,7 +3526,22 @@
                   <a:schemeClr val="bg1"/>
                 </a:solidFill>
               </a:rPr>
-              <a:t>Modification of the Renal Risk Score in ANCA Associated Glomerulonephritis improves prediction</a:t>
+              <a:t>Modification of the Renal Risk Score in ANCA Associated </a:t>
+            </a:r>
+          </a:p>
+          <a:p>
+            <a:pPr algn="ctr">
+              <a:lnSpc>
+                <a:spcPct val="107000"/>
+              </a:lnSpc>
+            </a:pPr>
+            <a:r>
+              <a:rPr lang="en-GB" sz="6000" b="1" dirty="0">
+                <a:solidFill>
+                  <a:schemeClr val="bg1"/>
+                </a:solidFill>
+              </a:rPr>
+              <a:t>Glomerulonephritis improves prediction further</a:t>
             </a:r>
           </a:p>
           <a:p>
@@ -3649,7 +3664,7 @@
           <p:nvPr>
             <p:extLst>
               <p:ext uri="{D42A27DB-BD31-4B8C-83A1-F6EECF244321}">
-                <p14:modId xmlns:p14="http://schemas.microsoft.com/office/powerpoint/2010/main" val="2545804783"/>
+                <p14:modId xmlns:p14="http://schemas.microsoft.com/office/powerpoint/2010/main" val="3780470499"/>
               </p:ext>
             </p:extLst>
           </p:nvPr>
@@ -3805,7 +3820,7 @@
                       </a:endParaRPr>
                     </a:p>
                   </a:txBody>
-                  <a:tcPr>
+                  <a:tcPr marL="144000" marR="144000" marT="72000" marB="72000">
                     <a:lnL w="28575" cap="flat" cmpd="sng" algn="ctr">
                       <a:solidFill>
                         <a:srgbClr val="941B80"/>
@@ -3872,14 +3887,14 @@
           <p:nvPr>
             <p:extLst>
               <p:ext uri="{D42A27DB-BD31-4B8C-83A1-F6EECF244321}">
-                <p14:modId xmlns:p14="http://schemas.microsoft.com/office/powerpoint/2010/main" val="2643600498"/>
+                <p14:modId xmlns:p14="http://schemas.microsoft.com/office/powerpoint/2010/main" val="1438162362"/>
               </p:ext>
             </p:extLst>
           </p:nvPr>
         </p:nvGraphicFramePr>
         <p:xfrm>
           <a:off x="13524310" y="6315144"/>
-          <a:ext cx="15682587" cy="10524178"/>
+          <a:ext cx="15682587" cy="10934827"/>
         </p:xfrm>
         <a:graphic>
           <a:graphicData uri="http://schemas.openxmlformats.org/drawingml/2006/table">
@@ -3902,6 +3917,7 @@
                     <a:bodyPr/>
                     <a:lstStyle/>
                     <a:p>
+                      <a:pPr algn="just"/>
                       <a:r>
                         <a:rPr lang="en-GB" sz="6000" dirty="0"/>
                         <a:t>Materials and methods</a:t>
@@ -3953,7 +3969,7 @@
                     <a:bodyPr/>
                     <a:lstStyle/>
                     <a:p>
-                      <a:pPr marL="0" marR="0" lvl="0" indent="0" algn="l" defTabSz="3027487" rtl="0" eaLnBrk="1" fontAlgn="auto" latinLnBrk="0" hangingPunct="1">
+                      <a:pPr marL="0" marR="0" lvl="0" indent="0" algn="just" defTabSz="3027487" rtl="0" eaLnBrk="1" fontAlgn="auto" latinLnBrk="0" hangingPunct="1">
                         <a:lnSpc>
                           <a:spcPct val="100000"/>
                         </a:lnSpc>
@@ -3980,7 +3996,7 @@
                           <a:ea typeface="+mn-ea"/>
                           <a:cs typeface="+mn-cs"/>
                         </a:rPr>
-                        <a:t>We investigated a retrospective multicentre international longitudinal cohort from referral centres and registries (</a:t>
+                        <a:t>We investigated a retrospective multicentre international longitudinal cohort from referral centres and registries around the world (</a:t>
                       </a:r>
                       <a:r>
                         <a:rPr lang="en-US" sz="3200" kern="1200" dirty="0">
@@ -4032,7 +4048,7 @@
                       </a:r>
                     </a:p>
                     <a:p>
-                      <a:pPr marL="0" marR="0" lvl="0" indent="0" algn="l" defTabSz="3027487" rtl="0" eaLnBrk="1" fontAlgn="auto" latinLnBrk="0" hangingPunct="1">
+                      <a:pPr marL="0" marR="0" lvl="0" indent="0" algn="just" defTabSz="3027487" rtl="0" eaLnBrk="1" fontAlgn="auto" latinLnBrk="0" hangingPunct="1">
                         <a:lnSpc>
                           <a:spcPct val="100000"/>
                         </a:lnSpc>
@@ -4059,11 +4075,11 @@
                           <a:ea typeface="+mn-ea"/>
                           <a:cs typeface="+mn-cs"/>
                         </a:rPr>
-                        <a:t>Patients included had a biopsy proven ANCA glomerulonephritis (GN). </a:t>
-                      </a:r>
-                    </a:p>
-                    <a:p>
-                      <a:pPr marL="0" marR="0" lvl="0" indent="0" algn="l" defTabSz="3027487" rtl="0" eaLnBrk="1" fontAlgn="auto" latinLnBrk="0" hangingPunct="1">
+                        <a:t>Included were patients with a biopsy proven ANCA associated glomerulonephritis (GN). </a:t>
+                      </a:r>
+                    </a:p>
+                    <a:p>
+                      <a:pPr marL="0" marR="0" lvl="0" indent="0" algn="just" defTabSz="3027487" rtl="0" eaLnBrk="1" fontAlgn="auto" latinLnBrk="0" hangingPunct="1">
                         <a:lnSpc>
                           <a:spcPct val="100000"/>
                         </a:lnSpc>
@@ -4102,7 +4118,7 @@
                           <a:ea typeface="+mn-ea"/>
                           <a:cs typeface="+mn-cs"/>
                         </a:rPr>
-                        <a:t>defined as RRT for at least 12 weeks and continued until last follow up</a:t>
+                        <a:t>defined as renal replacement therapy (RRT) for at least 12 weeks and continued until last follow up</a:t>
                       </a:r>
                       <a:r>
                         <a:rPr lang="en-GB" sz="3200" kern="1200" dirty="0">
@@ -4118,7 +4134,7 @@
                       </a:r>
                     </a:p>
                     <a:p>
-                      <a:pPr marL="0" marR="0" lvl="0" indent="0" algn="l" defTabSz="3027487" rtl="0" eaLnBrk="1" fontAlgn="auto" latinLnBrk="0" hangingPunct="1">
+                      <a:pPr marL="0" marR="0" lvl="0" indent="0" algn="just" defTabSz="3027487" rtl="0" eaLnBrk="1" fontAlgn="auto" latinLnBrk="0" hangingPunct="1">
                         <a:lnSpc>
                           <a:spcPct val="100000"/>
                         </a:lnSpc>
@@ -4145,11 +4161,11 @@
                           <a:ea typeface="+mn-ea"/>
                           <a:cs typeface="+mn-cs"/>
                         </a:rPr>
-                        <a:t>Kaplan-Meier estimates and Harrell’s C were used to assess model performance. Cox Proportion Hazards was used to reweigh risk factors and develop a modified scoring system, with points assigned proportional to the parameters beta coefficient. </a:t>
-                      </a:r>
-                    </a:p>
-                    <a:p>
-                      <a:pPr marL="0" marR="0" lvl="0" indent="0" algn="l" defTabSz="3027487" rtl="0" eaLnBrk="1" fontAlgn="auto" latinLnBrk="0" hangingPunct="1">
+                        <a:t>Kaplan-Meier estimates and Harrell’s C were used to assess model performance. Cox Proportion Hazards were used to reweigh risk factors and develop a modified scoring system, with points assigned proportional to the parameters beta coefficient. </a:t>
+                      </a:r>
+                    </a:p>
+                    <a:p>
+                      <a:pPr marL="0" marR="0" lvl="0" indent="0" algn="just" defTabSz="3027487" rtl="0" eaLnBrk="1" fontAlgn="auto" latinLnBrk="0" hangingPunct="1">
                         <a:lnSpc>
                           <a:spcPct val="100000"/>
                         </a:lnSpc>
@@ -4176,7 +4192,7 @@
                           <a:ea typeface="+mn-ea"/>
                           <a:cs typeface="+mn-cs"/>
                         </a:rPr>
-                        <a:t>The Renal Risk Score was calculated for each patient using the eGFR at presentation (G0: eGFR&gt;15 ml/min/1.73m</a:t>
+                        <a:t>The Renal Risk Score was calculated for each patient using the estimated glomerular filtration rate (eGFR) at presentation (G0: eGFR&gt;15 ml/min/1.73m</a:t>
                       </a:r>
                       <a:r>
                         <a:rPr lang="en-US" sz="3200" kern="1200" baseline="30000" dirty="0">
@@ -4228,7 +4244,7 @@
                       </a:r>
                     </a:p>
                     <a:p>
-                      <a:pPr marL="0" marR="0" lvl="0" indent="0" algn="l" defTabSz="3027487" rtl="0" eaLnBrk="1" fontAlgn="auto" latinLnBrk="0" hangingPunct="1">
+                      <a:pPr marL="0" marR="0" lvl="0" indent="0" algn="just" defTabSz="3027487" rtl="0" eaLnBrk="1" fontAlgn="auto" latinLnBrk="0" hangingPunct="1">
                         <a:lnSpc>
                           <a:spcPct val="100000"/>
                         </a:lnSpc>
@@ -4268,7 +4284,7 @@
                       </a:endParaRPr>
                     </a:p>
                   </a:txBody>
-                  <a:tcPr>
+                  <a:tcPr marL="144000" marR="144000" marT="72000" marB="72000">
                     <a:lnL w="28575" cap="flat" cmpd="sng" algn="ctr">
                       <a:solidFill>
                         <a:srgbClr val="941B80"/>
@@ -4320,7 +4336,7 @@
           <p:nvPr>
             <p:extLst>
               <p:ext uri="{D42A27DB-BD31-4B8C-83A1-F6EECF244321}">
-                <p14:modId xmlns:p14="http://schemas.microsoft.com/office/powerpoint/2010/main" val="2709690948"/>
+                <p14:modId xmlns:p14="http://schemas.microsoft.com/office/powerpoint/2010/main" val="3191560785"/>
               </p:ext>
             </p:extLst>
           </p:nvPr>
@@ -4405,7 +4421,7 @@
                     <a:bodyPr/>
                     <a:lstStyle/>
                     <a:p>
-                      <a:pPr marL="0" marR="0" lvl="0" indent="0" algn="l" defTabSz="3027487" rtl="0" eaLnBrk="1" fontAlgn="auto" latinLnBrk="0" hangingPunct="1">
+                      <a:pPr marL="0" marR="0" lvl="0" indent="0" algn="just" defTabSz="3027487" rtl="0" eaLnBrk="1" fontAlgn="auto" latinLnBrk="0" hangingPunct="1">
                         <a:lnSpc>
                           <a:spcPct val="100000"/>
                         </a:lnSpc>
@@ -4436,7 +4452,7 @@
                       </a:r>
                     </a:p>
                     <a:p>
-                      <a:pPr marL="0" marR="0" lvl="0" indent="0" algn="l" defTabSz="3027487" rtl="0" eaLnBrk="1" fontAlgn="auto" latinLnBrk="0" hangingPunct="1">
+                      <a:pPr marL="0" marR="0" lvl="0" indent="0" algn="just" defTabSz="3027487" rtl="0" eaLnBrk="1" fontAlgn="auto" latinLnBrk="0" hangingPunct="1">
                         <a:lnSpc>
                           <a:spcPct val="100000"/>
                         </a:lnSpc>
@@ -4467,7 +4483,7 @@
                       </a:r>
                     </a:p>
                     <a:p>
-                      <a:pPr marL="0" marR="0" lvl="0" indent="0" algn="l" defTabSz="3027487" rtl="0" eaLnBrk="1" fontAlgn="auto" latinLnBrk="0" hangingPunct="1">
+                      <a:pPr marL="0" marR="0" lvl="0" indent="0" algn="just" defTabSz="3027487" rtl="0" eaLnBrk="1" fontAlgn="auto" latinLnBrk="0" hangingPunct="1">
                         <a:lnSpc>
                           <a:spcPct val="100000"/>
                         </a:lnSpc>
@@ -4498,7 +4514,7 @@
                       </a:r>
                     </a:p>
                     <a:p>
-                      <a:pPr marL="0" marR="0" lvl="0" indent="0" algn="l" defTabSz="3027487" rtl="0" eaLnBrk="1" fontAlgn="auto" latinLnBrk="0" hangingPunct="1">
+                      <a:pPr marL="0" marR="0" lvl="0" indent="0" algn="just" defTabSz="3027487" rtl="0" eaLnBrk="1" fontAlgn="auto" latinLnBrk="0" hangingPunct="1">
                         <a:lnSpc>
                           <a:spcPct val="100000"/>
                         </a:lnSpc>
@@ -4525,7 +4541,7 @@
                           <a:ea typeface="+mn-ea"/>
                           <a:cs typeface="+mn-cs"/>
                         </a:rPr>
-                        <a:t>We modified the score creating four risk groups with an additional continuous model to supply risk percentages and groups. The new risk score has replaces eGFR with creatinine and adds a second cut off (C0: &lt;250 </a:t>
+                        <a:t>We modified the score creating four risk groups with an additional continuous model to supply risk percentages and groups. The new risk score replaces eGFR with creatinine and adds a second cut off (C0: &lt;250 </a:t>
                       </a:r>
                       <a:r>
                         <a:rPr lang="el-GR" sz="3200" kern="1200" dirty="0">
@@ -4612,7 +4628,7 @@
                       </a:endParaRPr>
                     </a:p>
                   </a:txBody>
-                  <a:tcPr>
+                  <a:tcPr marL="144000" marR="144000" marT="72000" marB="72000">
                     <a:lnL w="28575" cap="flat" cmpd="sng" algn="ctr">
                       <a:solidFill>
                         <a:srgbClr val="941B80"/>
@@ -4664,7 +4680,7 @@
           <p:nvPr>
             <p:extLst>
               <p:ext uri="{D42A27DB-BD31-4B8C-83A1-F6EECF244321}">
-                <p14:modId xmlns:p14="http://schemas.microsoft.com/office/powerpoint/2010/main" val="2959996877"/>
+                <p14:modId xmlns:p14="http://schemas.microsoft.com/office/powerpoint/2010/main" val="3192383380"/>
               </p:ext>
             </p:extLst>
           </p:nvPr>
@@ -4746,7 +4762,7 @@
                     <a:bodyPr/>
                     <a:lstStyle/>
                     <a:p>
-                      <a:pPr marL="0" marR="0" lvl="0" indent="0" algn="l" defTabSz="3027487" rtl="0" eaLnBrk="1" fontAlgn="auto" latinLnBrk="0" hangingPunct="1">
+                      <a:pPr marL="0" marR="0" lvl="0" indent="0" algn="just" defTabSz="3027487" rtl="0" eaLnBrk="1" fontAlgn="auto" latinLnBrk="0" hangingPunct="1">
                         <a:lnSpc>
                           <a:spcPct val="100000"/>
                         </a:lnSpc>
@@ -4773,19 +4789,7 @@
                           <a:ea typeface="+mn-ea"/>
                           <a:cs typeface="+mn-cs"/>
                         </a:rPr>
-                        <a:t>We demonstrated the out-of-sample validity of the RRS and propose a modification of the score to improve prognostication and risk stratification for treatment and clinical trials. We believe that the risk score will be able to provide reliable predictions of renal survival which will assist deciding the balance of the aggressiveness of </a:t>
-                      </a:r>
-                      <a:r>
-                        <a:rPr lang="en-GB" sz="3200" kern="1200">
-                          <a:solidFill>
-                            <a:schemeClr val="dk1"/>
-                          </a:solidFill>
-                          <a:effectLst/>
-                          <a:latin typeface="+mn-lt"/>
-                          <a:ea typeface="+mn-ea"/>
-                          <a:cs typeface="+mn-cs"/>
-                        </a:rPr>
-                        <a:t>care given. </a:t>
+                        <a:t>We demonstrated the out-of-sample validity of the RRS and propose a modification of the score to improve prognostication and risk stratification for treatment and clinical trials. We believe that the risk score will be able to provide reliable predictions of renal survival and assist in decision making to balance benefits and risks of aggressive immunosuppression. </a:t>
                       </a:r>
                       <a:endParaRPr lang="en-GB" sz="3200" dirty="0">
                         <a:solidFill>
@@ -4794,7 +4798,7 @@
                       </a:endParaRPr>
                     </a:p>
                   </a:txBody>
-                  <a:tcPr>
+                  <a:tcPr marL="144000" marR="144000" marT="72000" marB="72000">
                     <a:lnL w="28575" cap="flat" cmpd="sng" algn="ctr">
                       <a:solidFill>
                         <a:srgbClr val="941B80"/>
@@ -4846,14 +4850,14 @@
           <p:nvPr>
             <p:extLst>
               <p:ext uri="{D42A27DB-BD31-4B8C-83A1-F6EECF244321}">
-                <p14:modId xmlns:p14="http://schemas.microsoft.com/office/powerpoint/2010/main" val="1530099902"/>
+                <p14:modId xmlns:p14="http://schemas.microsoft.com/office/powerpoint/2010/main" val="2883197682"/>
               </p:ext>
             </p:extLst>
           </p:nvPr>
         </p:nvGraphicFramePr>
         <p:xfrm>
-          <a:off x="22326843" y="30602842"/>
-          <a:ext cx="7316861" cy="3354629"/>
+          <a:off x="22558846" y="30602842"/>
+          <a:ext cx="6648051" cy="3354629"/>
         </p:xfrm>
         <a:graphic>
           <a:graphicData uri="http://schemas.openxmlformats.org/drawingml/2006/table">
@@ -4863,7 +4867,7 @@
                 <a:tableStyleId>{5C22544A-7EE6-4342-B048-85BDC9FD1C3A}</a:tableStyleId>
               </a:tblPr>
               <a:tblGrid>
-                <a:gridCol w="7316861">
+                <a:gridCol w="6648051">
                   <a:extLst>
                     <a:ext uri="{9D8B030D-6E8A-4147-A177-3AD203B41FA5}">
                       <a16:colId xmlns:a16="http://schemas.microsoft.com/office/drawing/2014/main" val="2279542096"/>
@@ -4928,7 +4932,7 @@
                     <a:bodyPr/>
                     <a:lstStyle/>
                     <a:p>
-                      <a:pPr marL="457200" indent="-457200">
+                      <a:pPr marL="457200" indent="-457200" algn="just">
                         <a:buFont typeface="Arial" panose="020B0604020202020204" pitchFamily="34" charset="0"/>
                         <a:buChar char="•"/>
                       </a:pPr>
@@ -4942,7 +4946,7 @@
                       </a:r>
                     </a:p>
                     <a:p>
-                      <a:pPr marL="457200" indent="-457200">
+                      <a:pPr marL="457200" indent="-457200" algn="just">
                         <a:buFont typeface="Arial" panose="020B0604020202020204" pitchFamily="34" charset="0"/>
                         <a:buChar char="•"/>
                       </a:pPr>
@@ -4956,7 +4960,7 @@
                       </a:r>
                     </a:p>
                   </a:txBody>
-                  <a:tcPr>
+                  <a:tcPr marL="144000" marR="144000" marT="72000" marB="72000">
                     <a:lnL w="28575" cap="flat" cmpd="sng" algn="ctr">
                       <a:solidFill>
                         <a:srgbClr val="941B80"/>
@@ -6028,7 +6032,7 @@
           <p:nvPr>
             <p:extLst>
               <p:ext uri="{D42A27DB-BD31-4B8C-83A1-F6EECF244321}">
-                <p14:modId xmlns:p14="http://schemas.microsoft.com/office/powerpoint/2010/main" val="2076307447"/>
+                <p14:modId xmlns:p14="http://schemas.microsoft.com/office/powerpoint/2010/main" val="2339997510"/>
               </p:ext>
             </p:extLst>
           </p:nvPr>
@@ -6110,7 +6114,7 @@
                     <a:bodyPr/>
                     <a:lstStyle/>
                     <a:p>
-                      <a:pPr marL="0" marR="0" lvl="0" indent="0" algn="l" defTabSz="3027487" rtl="0" eaLnBrk="1" fontAlgn="auto" latinLnBrk="0" hangingPunct="1">
+                      <a:pPr marL="0" marR="0" lvl="0" indent="0" algn="just" defTabSz="3027487" rtl="0" eaLnBrk="1" fontAlgn="auto" latinLnBrk="0" hangingPunct="1">
                         <a:lnSpc>
                           <a:spcPct val="100000"/>
                         </a:lnSpc>
@@ -6172,7 +6176,7 @@
                       </a:endParaRPr>
                     </a:p>
                   </a:txBody>
-                  <a:tcPr>
+                  <a:tcPr marL="144000" marR="144000" marT="72000" marB="72000">
                     <a:lnL w="28575" cap="flat" cmpd="sng" algn="ctr">
                       <a:solidFill>
                         <a:srgbClr val="941B80"/>
@@ -8397,14 +8401,14 @@
           <p:nvPr>
             <p:extLst>
               <p:ext uri="{D42A27DB-BD31-4B8C-83A1-F6EECF244321}">
-                <p14:modId xmlns:p14="http://schemas.microsoft.com/office/powerpoint/2010/main" val="1441639816"/>
+                <p14:modId xmlns:p14="http://schemas.microsoft.com/office/powerpoint/2010/main" val="3369904610"/>
               </p:ext>
             </p:extLst>
           </p:nvPr>
         </p:nvGraphicFramePr>
         <p:xfrm>
-          <a:off x="22326843" y="34292944"/>
-          <a:ext cx="7356995" cy="3978864"/>
+          <a:off x="22558846" y="34292944"/>
+          <a:ext cx="6648052" cy="3978864"/>
         </p:xfrm>
         <a:graphic>
           <a:graphicData uri="http://schemas.openxmlformats.org/drawingml/2006/table">
@@ -8414,7 +8418,7 @@
                 <a:tableStyleId>{5C22544A-7EE6-4342-B048-85BDC9FD1C3A}</a:tableStyleId>
               </a:tblPr>
               <a:tblGrid>
-                <a:gridCol w="7356995">
+                <a:gridCol w="6648052">
                   <a:extLst>
                     <a:ext uri="{9D8B030D-6E8A-4147-A177-3AD203B41FA5}">
                       <a16:colId xmlns:a16="http://schemas.microsoft.com/office/drawing/2014/main" val="2279542096"/>
@@ -8501,21 +8505,16 @@
                         <a:t>sgbstats</a:t>
                       </a:r>
                       <a:r>
-                        <a:rPr lang="en-GB" sz="3200">
+                        <a:rPr lang="en-GB" sz="3200" dirty="0">
                           <a:solidFill>
                             <a:schemeClr val="tx1"/>
                           </a:solidFill>
                         </a:rPr>
                         <a:t>/ANCA</a:t>
                       </a:r>
-                      <a:endParaRPr lang="en-GB" sz="3200" dirty="0">
-                        <a:solidFill>
-                          <a:schemeClr val="tx1"/>
-                        </a:solidFill>
-                      </a:endParaRPr>
                     </a:p>
                   </a:txBody>
-                  <a:tcPr>
+                  <a:tcPr marL="144000" marR="144000" marT="72000" marB="72000">
                     <a:lnL w="28575" cap="flat" cmpd="sng" algn="ctr">
                       <a:solidFill>
                         <a:srgbClr val="941B80"/>
@@ -8573,7 +8572,7 @@
           <p:nvPr>
             <p:extLst>
               <p:ext uri="{D42A27DB-BD31-4B8C-83A1-F6EECF244321}">
-                <p14:modId xmlns:p14="http://schemas.microsoft.com/office/powerpoint/2010/main" val="964847228"/>
+                <p14:modId xmlns:p14="http://schemas.microsoft.com/office/powerpoint/2010/main" val="859420259"/>
               </p:ext>
             </p:extLst>
           </p:nvPr>
@@ -8693,7 +8692,7 @@
                       </a:endParaRPr>
                     </a:p>
                   </a:txBody>
-                  <a:tcPr>
+                  <a:tcPr marL="144000" marR="144000" marT="72000" marB="72000">
                     <a:lnL w="28575" cap="flat" cmpd="sng" algn="ctr">
                       <a:solidFill>
                         <a:srgbClr val="941B80"/>
@@ -8764,8 +8763,8 @@
         </p:blipFill>
         <p:spPr>
           <a:xfrm>
-            <a:off x="13524310" y="17302049"/>
-            <a:ext cx="15679018" cy="13159472"/>
+            <a:off x="13524310" y="17539411"/>
+            <a:ext cx="15682587" cy="12941160"/>
           </a:xfrm>
           <a:prstGeom prst="rect">
             <a:avLst/>
@@ -8787,7 +8786,7 @@
           <p:nvPr>
             <p:extLst>
               <p:ext uri="{D42A27DB-BD31-4B8C-83A1-F6EECF244321}">
-                <p14:modId xmlns:p14="http://schemas.microsoft.com/office/powerpoint/2010/main" val="1985503155"/>
+                <p14:modId xmlns:p14="http://schemas.microsoft.com/office/powerpoint/2010/main" val="1311769054"/>
               </p:ext>
             </p:extLst>
           </p:nvPr>
@@ -8869,7 +8868,7 @@
                     <a:bodyPr/>
                     <a:lstStyle/>
                     <a:p>
-                      <a:pPr marL="0" marR="0" lvl="0" indent="0" algn="l" defTabSz="3027487" rtl="0" eaLnBrk="1" fontAlgn="auto" latinLnBrk="0" hangingPunct="1">
+                      <a:pPr marL="0" marR="0" lvl="0" indent="0" algn="just" defTabSz="3027487" rtl="0" eaLnBrk="1" fontAlgn="auto" latinLnBrk="0" hangingPunct="1">
                         <a:lnSpc>
                           <a:spcPct val="100000"/>
                         </a:lnSpc>
@@ -8905,7 +8904,7 @@
                       </a:endParaRPr>
                     </a:p>
                   </a:txBody>
-                  <a:tcPr>
+                  <a:tcPr marL="144000" marR="144000" marT="72000" marB="72000">
                     <a:lnL w="28575" cap="flat" cmpd="sng" algn="ctr">
                       <a:solidFill>
                         <a:srgbClr val="941B80"/>
@@ -8975,8 +8974,8 @@
         </p:blipFill>
         <p:spPr>
           <a:xfrm>
-            <a:off x="22496888" y="35832647"/>
-            <a:ext cx="2401462" cy="2439161"/>
+            <a:off x="22733014" y="35879314"/>
+            <a:ext cx="2253092" cy="2288462"/>
           </a:xfrm>
           <a:prstGeom prst="rect">
             <a:avLst/>

</xml_diff>